<commit_message>
Poster pdf and pptx
Added pdf version of poster and updated poster
</commit_message>
<xml_diff>
--- a/MovieJournal_Poster.pptx
+++ b/MovieJournal_Poster.pptx
@@ -3282,7 +3282,27 @@
                 <a:latin typeface="Roboto" panose="02000000000000000000" pitchFamily="2" charset="0"/>
                 <a:ea typeface="Roboto" panose="02000000000000000000" pitchFamily="2" charset="0"/>
               </a:rPr>
-              <a:t>Android Development – Learning and implementing UI best practices in a mobile environment</a:t>
+              <a:t>Android Development – Learning </a:t>
+            </a:r>
+            <a:r>
+              <a:rPr lang="en-US" sz="3588">
+                <a:solidFill>
+                  <a:prstClr val="white"/>
+                </a:solidFill>
+                <a:latin typeface="Roboto" panose="02000000000000000000" pitchFamily="2" charset="0"/>
+                <a:ea typeface="Roboto" panose="02000000000000000000" pitchFamily="2" charset="0"/>
+              </a:rPr>
+              <a:t>and implementing </a:t>
+            </a:r>
+            <a:r>
+              <a:rPr lang="en-US" sz="3588" dirty="0">
+                <a:solidFill>
+                  <a:prstClr val="white"/>
+                </a:solidFill>
+                <a:latin typeface="Roboto" panose="02000000000000000000" pitchFamily="2" charset="0"/>
+                <a:ea typeface="Roboto" panose="02000000000000000000" pitchFamily="2" charset="0"/>
+              </a:rPr>
+              <a:t>best practices in a mobile environment</a:t>
             </a:r>
           </a:p>
           <a:p>
@@ -3842,7 +3862,7 @@
                   <a:schemeClr val="bg1"/>
                 </a:solidFill>
               </a:rPr>
-              <a:t>Computer Science?</a:t>
+              <a:t>Computer Science</a:t>
             </a:r>
           </a:p>
         </p:txBody>

</xml_diff>